<commit_message>
Remove other proposals. Add new logo.
</commit_message>
<xml_diff>
--- a/PPT/porumacausa.pptx
+++ b/PPT/porumacausa.pptx
@@ -6,6 +6,7 @@
   </p:sldMasterIdLst>
   <p:sldIdLst>
     <p:sldId id="256" r:id="rId2"/>
+    <p:sldId id="257" r:id="rId3"/>
   </p:sldIdLst>
   <p:sldSz cx="12192000" cy="6858000"/>
   <p:notesSz cx="6858000" cy="9144000"/>
@@ -104,6 +105,11 @@
       </a:defRPr>
     </a:lvl9pPr>
   </p:defaultTextStyle>
+  <p:extLst>
+    <p:ext uri="{EFAFB233-063F-42B5-8137-9DF3F51BA10A}">
+      <p15:sldGuideLst xmlns:p15="http://schemas.microsoft.com/office/powerpoint/2012/main"/>
+    </p:ext>
+  </p:extLst>
 </p:presentation>
 </file>
 
@@ -238,7 +244,7 @@
           <a:p>
             <a:fld id="{C92E202C-74FA-1E4C-9354-78BB42DCC506}" type="datetimeFigureOut">
               <a:rPr lang="pt-PT" smtClean="0"/>
-              <a:t>01/07/17</a:t>
+              <a:t>02/07/17</a:t>
             </a:fld>
             <a:endParaRPr lang="pt-PT"/>
           </a:p>
@@ -408,7 +414,7 @@
           <a:p>
             <a:fld id="{C92E202C-74FA-1E4C-9354-78BB42DCC506}" type="datetimeFigureOut">
               <a:rPr lang="pt-PT" smtClean="0"/>
-              <a:t>01/07/17</a:t>
+              <a:t>02/07/17</a:t>
             </a:fld>
             <a:endParaRPr lang="pt-PT"/>
           </a:p>
@@ -588,7 +594,7 @@
           <a:p>
             <a:fld id="{C92E202C-74FA-1E4C-9354-78BB42DCC506}" type="datetimeFigureOut">
               <a:rPr lang="pt-PT" smtClean="0"/>
-              <a:t>01/07/17</a:t>
+              <a:t>02/07/17</a:t>
             </a:fld>
             <a:endParaRPr lang="pt-PT"/>
           </a:p>
@@ -758,7 +764,7 @@
           <a:p>
             <a:fld id="{C92E202C-74FA-1E4C-9354-78BB42DCC506}" type="datetimeFigureOut">
               <a:rPr lang="pt-PT" smtClean="0"/>
-              <a:t>01/07/17</a:t>
+              <a:t>02/07/17</a:t>
             </a:fld>
             <a:endParaRPr lang="pt-PT"/>
           </a:p>
@@ -1004,7 +1010,7 @@
           <a:p>
             <a:fld id="{C92E202C-74FA-1E4C-9354-78BB42DCC506}" type="datetimeFigureOut">
               <a:rPr lang="pt-PT" smtClean="0"/>
-              <a:t>01/07/17</a:t>
+              <a:t>02/07/17</a:t>
             </a:fld>
             <a:endParaRPr lang="pt-PT"/>
           </a:p>
@@ -1236,7 +1242,7 @@
           <a:p>
             <a:fld id="{C92E202C-74FA-1E4C-9354-78BB42DCC506}" type="datetimeFigureOut">
               <a:rPr lang="pt-PT" smtClean="0"/>
-              <a:t>01/07/17</a:t>
+              <a:t>02/07/17</a:t>
             </a:fld>
             <a:endParaRPr lang="pt-PT"/>
           </a:p>
@@ -1603,7 +1609,7 @@
           <a:p>
             <a:fld id="{C92E202C-74FA-1E4C-9354-78BB42DCC506}" type="datetimeFigureOut">
               <a:rPr lang="pt-PT" smtClean="0"/>
-              <a:t>01/07/17</a:t>
+              <a:t>02/07/17</a:t>
             </a:fld>
             <a:endParaRPr lang="pt-PT"/>
           </a:p>
@@ -1721,7 +1727,7 @@
           <a:p>
             <a:fld id="{C92E202C-74FA-1E4C-9354-78BB42DCC506}" type="datetimeFigureOut">
               <a:rPr lang="pt-PT" smtClean="0"/>
-              <a:t>01/07/17</a:t>
+              <a:t>02/07/17</a:t>
             </a:fld>
             <a:endParaRPr lang="pt-PT"/>
           </a:p>
@@ -1816,7 +1822,7 @@
           <a:p>
             <a:fld id="{C92E202C-74FA-1E4C-9354-78BB42DCC506}" type="datetimeFigureOut">
               <a:rPr lang="pt-PT" smtClean="0"/>
-              <a:t>01/07/17</a:t>
+              <a:t>02/07/17</a:t>
             </a:fld>
             <a:endParaRPr lang="pt-PT"/>
           </a:p>
@@ -2093,7 +2099,7 @@
           <a:p>
             <a:fld id="{C92E202C-74FA-1E4C-9354-78BB42DCC506}" type="datetimeFigureOut">
               <a:rPr lang="pt-PT" smtClean="0"/>
-              <a:t>01/07/17</a:t>
+              <a:t>02/07/17</a:t>
             </a:fld>
             <a:endParaRPr lang="pt-PT"/>
           </a:p>
@@ -2346,7 +2352,7 @@
           <a:p>
             <a:fld id="{C92E202C-74FA-1E4C-9354-78BB42DCC506}" type="datetimeFigureOut">
               <a:rPr lang="pt-PT" smtClean="0"/>
-              <a:t>01/07/17</a:t>
+              <a:t>02/07/17</a:t>
             </a:fld>
             <a:endParaRPr lang="pt-PT"/>
           </a:p>
@@ -2559,7 +2565,7 @@
           <a:p>
             <a:fld id="{C92E202C-74FA-1E4C-9354-78BB42DCC506}" type="datetimeFigureOut">
               <a:rPr lang="pt-PT" smtClean="0"/>
-              <a:t>01/07/17</a:t>
+              <a:t>02/07/17</a:t>
             </a:fld>
             <a:endParaRPr lang="pt-PT"/>
           </a:p>
@@ -3391,6 +3397,275 @@
 </p:sld>
 </file>
 
+<file path=ppt/slides/slide2.xml><?xml version="1.0" encoding="utf-8"?>
+<p:sld xmlns:a="http://schemas.openxmlformats.org/drawingml/2006/main" xmlns:r="http://schemas.openxmlformats.org/officeDocument/2006/relationships" xmlns:p="http://schemas.openxmlformats.org/presentationml/2006/main">
+  <p:cSld>
+    <p:bg>
+      <p:bgPr>
+        <a:solidFill>
+          <a:schemeClr val="tx1"/>
+        </a:solidFill>
+        <a:effectLst/>
+      </p:bgPr>
+    </p:bg>
+    <p:spTree>
+      <p:nvGrpSpPr>
+        <p:cNvPr id="1" name=""/>
+        <p:cNvGrpSpPr/>
+        <p:nvPr/>
+      </p:nvGrpSpPr>
+      <p:grpSpPr>
+        <a:xfrm>
+          <a:off x="0" y="0"/>
+          <a:ext cx="0" cy="0"/>
+          <a:chOff x="0" y="0"/>
+          <a:chExt cx="0" cy="0"/>
+        </a:xfrm>
+      </p:grpSpPr>
+      <p:grpSp>
+        <p:nvGrpSpPr>
+          <p:cNvPr id="18" name="Grupo 17"/>
+          <p:cNvGrpSpPr/>
+          <p:nvPr/>
+        </p:nvGrpSpPr>
+        <p:grpSpPr>
+          <a:xfrm>
+            <a:off x="3353799" y="4936019"/>
+            <a:ext cx="5224508" cy="1292662"/>
+            <a:chOff x="3353799" y="4936019"/>
+            <a:chExt cx="5224508" cy="1292662"/>
+          </a:xfrm>
+        </p:grpSpPr>
+        <p:sp>
+          <p:nvSpPr>
+            <p:cNvPr id="16" name="Retângulo 15"/>
+            <p:cNvSpPr/>
+            <p:nvPr/>
+          </p:nvSpPr>
+          <p:spPr>
+            <a:xfrm>
+              <a:off x="3353799" y="4936019"/>
+              <a:ext cx="5224508" cy="923330"/>
+            </a:xfrm>
+            <a:prstGeom prst="rect">
+              <a:avLst/>
+            </a:prstGeom>
+            <a:noFill/>
+          </p:spPr>
+          <p:txBody>
+            <a:bodyPr wrap="none" lIns="91440" tIns="45720" rIns="91440" bIns="45720">
+              <a:spAutoFit/>
+            </a:bodyPr>
+            <a:lstStyle/>
+            <a:p>
+              <a:pPr algn="ctr"/>
+              <a:r>
+                <a:rPr lang="pt-PT" sz="5400" b="1" cap="none" spc="0" dirty="0" smtClean="0">
+                  <a:ln w="12700">
+                    <a:noFill/>
+                    <a:prstDash val="solid"/>
+                  </a:ln>
+                  <a:solidFill>
+                    <a:srgbClr val="FF0000"/>
+                  </a:solidFill>
+                  <a:latin typeface="Arial" charset="0"/>
+                  <a:ea typeface="Arial" charset="0"/>
+                  <a:cs typeface="Arial" charset="0"/>
+                </a:rPr>
+                <a:t>{porumacausa}</a:t>
+              </a:r>
+              <a:endParaRPr lang="pt-PT" sz="5400" b="1" cap="none" spc="0" dirty="0">
+                <a:ln w="12700">
+                  <a:noFill/>
+                  <a:prstDash val="solid"/>
+                </a:ln>
+                <a:solidFill>
+                  <a:srgbClr val="FF0000"/>
+                </a:solidFill>
+                <a:latin typeface="Arial" charset="0"/>
+                <a:ea typeface="Arial" charset="0"/>
+                <a:cs typeface="Arial" charset="0"/>
+              </a:endParaRPr>
+            </a:p>
+          </p:txBody>
+        </p:sp>
+        <p:sp>
+          <p:nvSpPr>
+            <p:cNvPr id="17" name="CaixaDeTexto 16"/>
+            <p:cNvSpPr txBox="1"/>
+            <p:nvPr/>
+          </p:nvSpPr>
+          <p:spPr>
+            <a:xfrm>
+              <a:off x="5165736" y="5859349"/>
+              <a:ext cx="3121367" cy="369332"/>
+            </a:xfrm>
+            <a:prstGeom prst="rect">
+              <a:avLst/>
+            </a:prstGeom>
+            <a:noFill/>
+          </p:spPr>
+          <p:txBody>
+            <a:bodyPr wrap="none" rtlCol="0">
+              <a:spAutoFit/>
+            </a:bodyPr>
+            <a:lstStyle/>
+            <a:p>
+              <a:r>
+                <a:rPr lang="pt-PT" b="1" dirty="0" smtClean="0">
+                  <a:solidFill>
+                    <a:schemeClr val="bg1"/>
+                  </a:solidFill>
+                  <a:latin typeface="Arial" charset="0"/>
+                  <a:ea typeface="Arial" charset="0"/>
+                  <a:cs typeface="Arial" charset="0"/>
+                </a:rPr>
+                <a:t>Makers Community Impact</a:t>
+              </a:r>
+              <a:endParaRPr lang="pt-PT" b="1" dirty="0">
+                <a:solidFill>
+                  <a:schemeClr val="bg1"/>
+                </a:solidFill>
+                <a:latin typeface="Arial" charset="0"/>
+                <a:ea typeface="Arial" charset="0"/>
+                <a:cs typeface="Arial" charset="0"/>
+              </a:endParaRPr>
+            </a:p>
+          </p:txBody>
+        </p:sp>
+      </p:grpSp>
+      <p:grpSp>
+        <p:nvGrpSpPr>
+          <p:cNvPr id="15" name="Grupo 14"/>
+          <p:cNvGrpSpPr/>
+          <p:nvPr/>
+        </p:nvGrpSpPr>
+        <p:grpSpPr>
+          <a:xfrm>
+            <a:off x="3353799" y="2535361"/>
+            <a:ext cx="5224508" cy="1292662"/>
+            <a:chOff x="3353799" y="4936019"/>
+            <a:chExt cx="5224508" cy="1292662"/>
+          </a:xfrm>
+        </p:grpSpPr>
+        <p:sp>
+          <p:nvSpPr>
+            <p:cNvPr id="19" name="Retângulo 18"/>
+            <p:cNvSpPr/>
+            <p:nvPr/>
+          </p:nvSpPr>
+          <p:spPr>
+            <a:xfrm>
+              <a:off x="3353799" y="4936019"/>
+              <a:ext cx="5224508" cy="923330"/>
+            </a:xfrm>
+            <a:prstGeom prst="rect">
+              <a:avLst/>
+            </a:prstGeom>
+            <a:noFill/>
+          </p:spPr>
+          <p:txBody>
+            <a:bodyPr wrap="none" lIns="91440" tIns="45720" rIns="91440" bIns="45720">
+              <a:spAutoFit/>
+            </a:bodyPr>
+            <a:lstStyle/>
+            <a:p>
+              <a:pPr algn="ctr"/>
+              <a:r>
+                <a:rPr lang="pt-PT" sz="5400" b="1" cap="none" spc="0" dirty="0" smtClean="0">
+                  <a:ln w="12700">
+                    <a:noFill/>
+                    <a:prstDash val="solid"/>
+                  </a:ln>
+                  <a:solidFill>
+                    <a:schemeClr val="bg1"/>
+                  </a:solidFill>
+                  <a:latin typeface="Arial" charset="0"/>
+                  <a:ea typeface="Arial" charset="0"/>
+                  <a:cs typeface="Arial" charset="0"/>
+                </a:rPr>
+                <a:t>{porumacausa}</a:t>
+              </a:r>
+              <a:endParaRPr lang="pt-PT" sz="5400" b="1" cap="none" spc="0" dirty="0">
+                <a:ln w="12700">
+                  <a:noFill/>
+                  <a:prstDash val="solid"/>
+                </a:ln>
+                <a:solidFill>
+                  <a:schemeClr val="bg1"/>
+                </a:solidFill>
+                <a:latin typeface="Arial" charset="0"/>
+                <a:ea typeface="Arial" charset="0"/>
+                <a:cs typeface="Arial" charset="0"/>
+              </a:endParaRPr>
+            </a:p>
+          </p:txBody>
+        </p:sp>
+        <p:sp>
+          <p:nvSpPr>
+            <p:cNvPr id="20" name="CaixaDeTexto 19"/>
+            <p:cNvSpPr txBox="1"/>
+            <p:nvPr/>
+          </p:nvSpPr>
+          <p:spPr>
+            <a:xfrm>
+              <a:off x="5165736" y="5859349"/>
+              <a:ext cx="3121367" cy="369332"/>
+            </a:xfrm>
+            <a:prstGeom prst="rect">
+              <a:avLst/>
+            </a:prstGeom>
+            <a:noFill/>
+          </p:spPr>
+          <p:txBody>
+            <a:bodyPr wrap="none" rtlCol="0">
+              <a:spAutoFit/>
+            </a:bodyPr>
+            <a:lstStyle/>
+            <a:p>
+              <a:r>
+                <a:rPr lang="pt-PT" b="1" dirty="0" smtClean="0">
+                  <a:solidFill>
+                    <a:schemeClr val="bg1"/>
+                  </a:solidFill>
+                  <a:latin typeface="Arial" charset="0"/>
+                  <a:ea typeface="Arial" charset="0"/>
+                  <a:cs typeface="Arial" charset="0"/>
+                </a:rPr>
+                <a:t>Makers Community Impact</a:t>
+              </a:r>
+              <a:endParaRPr lang="pt-PT" b="1" dirty="0">
+                <a:solidFill>
+                  <a:schemeClr val="bg1"/>
+                </a:solidFill>
+                <a:latin typeface="Arial" charset="0"/>
+                <a:ea typeface="Arial" charset="0"/>
+                <a:cs typeface="Arial" charset="0"/>
+              </a:endParaRPr>
+            </a:p>
+          </p:txBody>
+        </p:sp>
+      </p:grpSp>
+    </p:spTree>
+    <p:extLst>
+      <p:ext uri="{BB962C8B-B14F-4D97-AF65-F5344CB8AC3E}">
+        <p14:creationId xmlns:p14="http://schemas.microsoft.com/office/powerpoint/2010/main" val="1190959765"/>
+      </p:ext>
+    </p:extLst>
+  </p:cSld>
+  <p:clrMapOvr>
+    <a:masterClrMapping/>
+  </p:clrMapOvr>
+  <p:timing>
+    <p:tnLst>
+      <p:par>
+        <p:cTn id="1" dur="indefinite" restart="never" nodeType="tmRoot"/>
+      </p:par>
+    </p:tnLst>
+  </p:timing>
+</p:sld>
+</file>
+
 <file path=ppt/theme/theme1.xml><?xml version="1.0" encoding="utf-8"?>
 <a:theme xmlns:a="http://schemas.openxmlformats.org/drawingml/2006/main" name="Tema do Office">
   <a:themeElements>

</xml_diff>